<commit_message>
Presentation Slides - Update
</commit_message>
<xml_diff>
--- a/Presentation Slides.pptx
+++ b/Presentation Slides.pptx
@@ -12,6 +12,9 @@
     <p:sldId id="262" r:id="rId6"/>
     <p:sldId id="259" r:id="rId7"/>
     <p:sldId id="263" r:id="rId8"/>
+    <p:sldId id="266" r:id="rId9"/>
+    <p:sldId id="264" r:id="rId10"/>
+    <p:sldId id="265" r:id="rId11"/>
   </p:sldIdLst>
   <p:sldSz cx="9144000" cy="6858000" type="screen4x3"/>
   <p:notesSz cx="6858000" cy="9144000"/>
@@ -3168,6 +3171,93 @@
 </p:sld>
 </file>
 
+<file path=ppt/slides/slide10.xml><?xml version="1.0" encoding="utf-8"?>
+<p:sld xmlns:a="http://schemas.openxmlformats.org/drawingml/2006/main" xmlns:r="http://schemas.openxmlformats.org/officeDocument/2006/relationships" xmlns:p="http://schemas.openxmlformats.org/presentationml/2006/main">
+  <p:cSld>
+    <p:spTree>
+      <p:nvGrpSpPr>
+        <p:cNvPr id="1" name=""/>
+        <p:cNvGrpSpPr/>
+        <p:nvPr/>
+      </p:nvGrpSpPr>
+      <p:grpSpPr>
+        <a:xfrm>
+          <a:off x="0" y="0"/>
+          <a:ext cx="0" cy="0"/>
+          <a:chOff x="0" y="0"/>
+          <a:chExt cx="0" cy="0"/>
+        </a:xfrm>
+      </p:grpSpPr>
+      <p:sp>
+        <p:nvSpPr>
+          <p:cNvPr id="2" name="Title 1"/>
+          <p:cNvSpPr>
+            <a:spLocks noGrp="1"/>
+          </p:cNvSpPr>
+          <p:nvPr>
+            <p:ph type="title"/>
+          </p:nvPr>
+        </p:nvSpPr>
+        <p:spPr/>
+        <p:txBody>
+          <a:bodyPr/>
+          <a:lstStyle/>
+          <a:p>
+            <a:r>
+              <a:rPr lang="en-US" dirty="0" smtClean="0"/>
+              <a:t>Changes Over Time</a:t>
+            </a:r>
+            <a:endParaRPr lang="en-US" dirty="0"/>
+          </a:p>
+        </p:txBody>
+      </p:sp>
+      <p:sp>
+        <p:nvSpPr>
+          <p:cNvPr id="3" name="Content Placeholder 2"/>
+          <p:cNvSpPr>
+            <a:spLocks noGrp="1"/>
+          </p:cNvSpPr>
+          <p:nvPr>
+            <p:ph idx="1"/>
+          </p:nvPr>
+        </p:nvSpPr>
+        <p:spPr/>
+        <p:txBody>
+          <a:bodyPr/>
+          <a:lstStyle/>
+          <a:p>
+            <a:r>
+              <a:rPr lang="en-US" dirty="0" err="1" smtClean="0"/>
+              <a:t>Localbitcoins</a:t>
+            </a:r>
+            <a:r>
+              <a:rPr lang="en-US" dirty="0" smtClean="0"/>
+              <a:t> has prices that vary too much</a:t>
+            </a:r>
+          </a:p>
+          <a:p>
+            <a:pPr lvl="1"/>
+            <a:r>
+              <a:rPr lang="en-US" dirty="0" smtClean="0"/>
+              <a:t>Cannot be compared well to the other exchanges</a:t>
+            </a:r>
+            <a:endParaRPr lang="en-US" dirty="0"/>
+          </a:p>
+        </p:txBody>
+      </p:sp>
+    </p:spTree>
+    <p:extLst>
+      <p:ext uri="{BB962C8B-B14F-4D97-AF65-F5344CB8AC3E}">
+        <p14:creationId xmlns:p14="http://schemas.microsoft.com/office/powerpoint/2010/main" val="163947078"/>
+      </p:ext>
+    </p:extLst>
+  </p:cSld>
+  <p:clrMapOvr>
+    <a:masterClrMapping/>
+  </p:clrMapOvr>
+</p:sld>
+</file>
+
 <file path=ppt/slides/slide2.xml><?xml version="1.0" encoding="utf-8"?>
 <p:sld xmlns:a="http://schemas.openxmlformats.org/drawingml/2006/main" xmlns:r="http://schemas.openxmlformats.org/officeDocument/2006/relationships" xmlns:p="http://schemas.openxmlformats.org/presentationml/2006/main">
   <p:cSld>
@@ -3449,8 +3539,20 @@
           <a:p>
             <a:r>
               <a:rPr lang="en-US" dirty="0" smtClean="0"/>
-              <a:t>Low spread between buy and sell prices</a:t>
-            </a:r>
+              <a:t>Low spread between buy and sell </a:t>
+            </a:r>
+            <a:r>
+              <a:rPr lang="en-US" dirty="0" smtClean="0"/>
+              <a:t>prices</a:t>
+            </a:r>
+          </a:p>
+          <a:p>
+            <a:pPr lvl="1"/>
+            <a:r>
+              <a:rPr lang="en-US" dirty="0" smtClean="0"/>
+              <a:t>Prices are for immediate buys and sells</a:t>
+            </a:r>
+            <a:endParaRPr lang="en-US" dirty="0" smtClean="0"/>
           </a:p>
           <a:p>
             <a:r>
@@ -3545,8 +3647,20 @@
           <a:p>
             <a:r>
               <a:rPr lang="en-US" dirty="0" smtClean="0"/>
-              <a:t>User-to-user exchange</a:t>
-            </a:r>
+              <a:t>User-to-user </a:t>
+            </a:r>
+            <a:r>
+              <a:rPr lang="en-US" dirty="0" smtClean="0"/>
+              <a:t>exchange</a:t>
+            </a:r>
+          </a:p>
+          <a:p>
+            <a:pPr lvl="1"/>
+            <a:r>
+              <a:rPr lang="en-US" dirty="0" smtClean="0"/>
+              <a:t>“flea market” for bitcoin</a:t>
+            </a:r>
+            <a:endParaRPr lang="en-US" dirty="0" smtClean="0"/>
           </a:p>
           <a:p>
             <a:r>
@@ -3557,8 +3671,20 @@
           <a:p>
             <a:r>
               <a:rPr lang="en-US" dirty="0" smtClean="0"/>
-              <a:t>Prices vary greatly</a:t>
-            </a:r>
+              <a:t>Prices vary </a:t>
+            </a:r>
+            <a:r>
+              <a:rPr lang="en-US" dirty="0" smtClean="0"/>
+              <a:t>greatly</a:t>
+            </a:r>
+          </a:p>
+          <a:p>
+            <a:pPr lvl="1"/>
+            <a:r>
+              <a:rPr lang="en-US" dirty="0" smtClean="0"/>
+              <a:t>Prices are offers by buyers and sellers</a:t>
+            </a:r>
+            <a:endParaRPr lang="en-US" dirty="0" smtClean="0"/>
           </a:p>
         </p:txBody>
       </p:sp>
@@ -3679,9 +3805,25 @@
               <a:t>Bitstamp</a:t>
             </a:r>
             <a:r>
-              <a:rPr lang="en-US" dirty="0"/>
+              <a:rPr lang="en-US" dirty="0" smtClean="0"/>
               <a:t>?</a:t>
             </a:r>
+          </a:p>
+          <a:p>
+            <a:pPr lvl="1"/>
+            <a:r>
+              <a:rPr lang="en-US" dirty="0" smtClean="0"/>
+              <a:t>Or only sell at </a:t>
+            </a:r>
+            <a:r>
+              <a:rPr lang="en-US" dirty="0" err="1" smtClean="0"/>
+              <a:t>Localbitcoins</a:t>
+            </a:r>
+            <a:r>
+              <a:rPr lang="en-US" dirty="0" smtClean="0"/>
+              <a:t>?</a:t>
+            </a:r>
+            <a:endParaRPr lang="en-US" dirty="0"/>
           </a:p>
         </p:txBody>
       </p:sp>
@@ -3762,8 +3904,20 @@
           <a:p>
             <a:r>
               <a:rPr lang="en-US" dirty="0" smtClean="0"/>
-              <a:t>Payment methods</a:t>
-            </a:r>
+              <a:t>Payment </a:t>
+            </a:r>
+            <a:r>
+              <a:rPr lang="en-US" dirty="0" smtClean="0"/>
+              <a:t>methods</a:t>
+            </a:r>
+          </a:p>
+          <a:p>
+            <a:pPr lvl="1"/>
+            <a:r>
+              <a:rPr lang="en-US" dirty="0" smtClean="0"/>
+              <a:t>Most important</a:t>
+            </a:r>
+            <a:endParaRPr lang="en-US" dirty="0" smtClean="0"/>
           </a:p>
           <a:p>
             <a:r>
@@ -3780,11 +3934,18 @@
           <a:p>
             <a:r>
               <a:rPr lang="en-US" dirty="0" smtClean="0"/>
-              <a:t>Volume </a:t>
-            </a:r>
-            <a:r>
-              <a:rPr lang="en-US" smtClean="0"/>
-              <a:t>of trades</a:t>
+              <a:t>Volume of </a:t>
+            </a:r>
+            <a:r>
+              <a:rPr lang="en-US" dirty="0" smtClean="0"/>
+              <a:t>trades</a:t>
+            </a:r>
+          </a:p>
+          <a:p>
+            <a:pPr lvl="1"/>
+            <a:r>
+              <a:rPr lang="en-US" dirty="0" smtClean="0"/>
+              <a:t>Higher volume = price is closer to an index price</a:t>
             </a:r>
             <a:endParaRPr lang="en-US" dirty="0"/>
           </a:p>
@@ -3807,6 +3968,268 @@
       </p:par>
     </p:tnLst>
   </p:timing>
+</p:sld>
+</file>
+
+<file path=ppt/slides/slide8.xml><?xml version="1.0" encoding="utf-8"?>
+<p:sld xmlns:a="http://schemas.openxmlformats.org/drawingml/2006/main" xmlns:r="http://schemas.openxmlformats.org/officeDocument/2006/relationships" xmlns:p="http://schemas.openxmlformats.org/presentationml/2006/main">
+  <p:cSld>
+    <p:spTree>
+      <p:nvGrpSpPr>
+        <p:cNvPr id="1" name=""/>
+        <p:cNvGrpSpPr/>
+        <p:nvPr/>
+      </p:nvGrpSpPr>
+      <p:grpSpPr>
+        <a:xfrm>
+          <a:off x="0" y="0"/>
+          <a:ext cx="0" cy="0"/>
+          <a:chOff x="0" y="0"/>
+          <a:chExt cx="0" cy="0"/>
+        </a:xfrm>
+      </p:grpSpPr>
+      <p:sp>
+        <p:nvSpPr>
+          <p:cNvPr id="2" name="Title 1"/>
+          <p:cNvSpPr>
+            <a:spLocks noGrp="1"/>
+          </p:cNvSpPr>
+          <p:nvPr>
+            <p:ph type="title"/>
+          </p:nvPr>
+        </p:nvSpPr>
+        <p:spPr/>
+        <p:txBody>
+          <a:bodyPr/>
+          <a:lstStyle/>
+          <a:p>
+            <a:r>
+              <a:rPr lang="en-US" dirty="0" smtClean="0"/>
+              <a:t>Payment Methods</a:t>
+            </a:r>
+            <a:endParaRPr lang="en-US" dirty="0"/>
+          </a:p>
+        </p:txBody>
+      </p:sp>
+      <p:sp>
+        <p:nvSpPr>
+          <p:cNvPr id="3" name="Content Placeholder 2"/>
+          <p:cNvSpPr>
+            <a:spLocks noGrp="1"/>
+          </p:cNvSpPr>
+          <p:nvPr>
+            <p:ph idx="1"/>
+          </p:nvPr>
+        </p:nvSpPr>
+        <p:spPr/>
+        <p:txBody>
+          <a:bodyPr/>
+          <a:lstStyle/>
+          <a:p>
+            <a:r>
+              <a:rPr lang="en-US" dirty="0" smtClean="0"/>
+              <a:t>Cash</a:t>
+            </a:r>
+          </a:p>
+          <a:p>
+            <a:pPr lvl="1"/>
+            <a:r>
+              <a:rPr lang="en-US" dirty="0" smtClean="0"/>
+              <a:t>Must meet in person</a:t>
+            </a:r>
+          </a:p>
+          <a:p>
+            <a:r>
+              <a:rPr lang="en-US" dirty="0" smtClean="0"/>
+              <a:t>Bank Transfer</a:t>
+            </a:r>
+          </a:p>
+          <a:p>
+            <a:pPr lvl="1"/>
+            <a:r>
+              <a:rPr lang="en-US" dirty="0" smtClean="0"/>
+              <a:t>Reduces anonymity</a:t>
+            </a:r>
+          </a:p>
+          <a:p>
+            <a:pPr lvl="1"/>
+            <a:r>
+              <a:rPr lang="en-US" dirty="0" smtClean="0"/>
+              <a:t>Slow, but relatively safe</a:t>
+            </a:r>
+          </a:p>
+          <a:p>
+            <a:r>
+              <a:rPr lang="en-US" dirty="0" err="1" smtClean="0"/>
+              <a:t>Paypal</a:t>
+            </a:r>
+            <a:endParaRPr lang="en-US" dirty="0" smtClean="0"/>
+          </a:p>
+          <a:p>
+            <a:pPr lvl="1"/>
+            <a:r>
+              <a:rPr lang="en-US" dirty="0" smtClean="0"/>
+              <a:t>Very risky</a:t>
+            </a:r>
+            <a:endParaRPr lang="en-US" dirty="0"/>
+          </a:p>
+          <a:p>
+            <a:pPr lvl="1"/>
+            <a:r>
+              <a:rPr lang="en-US" dirty="0" smtClean="0"/>
+              <a:t>Chargebacks…</a:t>
+            </a:r>
+          </a:p>
+        </p:txBody>
+      </p:sp>
+    </p:spTree>
+    <p:extLst>
+      <p:ext uri="{BB962C8B-B14F-4D97-AF65-F5344CB8AC3E}">
+        <p14:creationId xmlns:p14="http://schemas.microsoft.com/office/powerpoint/2010/main" val="1090150255"/>
+      </p:ext>
+    </p:extLst>
+  </p:cSld>
+  <p:clrMapOvr>
+    <a:masterClrMapping/>
+  </p:clrMapOvr>
+</p:sld>
+</file>
+
+<file path=ppt/slides/slide9.xml><?xml version="1.0" encoding="utf-8"?>
+<p:sld xmlns:a="http://schemas.openxmlformats.org/drawingml/2006/main" xmlns:r="http://schemas.openxmlformats.org/officeDocument/2006/relationships" xmlns:p="http://schemas.openxmlformats.org/presentationml/2006/main">
+  <p:cSld>
+    <p:spTree>
+      <p:nvGrpSpPr>
+        <p:cNvPr id="1" name=""/>
+        <p:cNvGrpSpPr/>
+        <p:nvPr/>
+      </p:nvGrpSpPr>
+      <p:grpSpPr>
+        <a:xfrm>
+          <a:off x="0" y="0"/>
+          <a:ext cx="0" cy="0"/>
+          <a:chOff x="0" y="0"/>
+          <a:chExt cx="0" cy="0"/>
+        </a:xfrm>
+      </p:grpSpPr>
+      <p:sp>
+        <p:nvSpPr>
+          <p:cNvPr id="2" name="Title 1"/>
+          <p:cNvSpPr>
+            <a:spLocks noGrp="1"/>
+          </p:cNvSpPr>
+          <p:nvPr>
+            <p:ph type="title"/>
+          </p:nvPr>
+        </p:nvSpPr>
+        <p:spPr/>
+        <p:txBody>
+          <a:bodyPr/>
+          <a:lstStyle/>
+          <a:p>
+            <a:r>
+              <a:rPr lang="en-US" dirty="0" smtClean="0"/>
+              <a:t>Changes Over Time</a:t>
+            </a:r>
+            <a:endParaRPr lang="en-US" dirty="0"/>
+          </a:p>
+        </p:txBody>
+      </p:sp>
+      <p:sp>
+        <p:nvSpPr>
+          <p:cNvPr id="3" name="Content Placeholder 2"/>
+          <p:cNvSpPr>
+            <a:spLocks noGrp="1"/>
+          </p:cNvSpPr>
+          <p:nvPr>
+            <p:ph idx="1"/>
+          </p:nvPr>
+        </p:nvSpPr>
+        <p:spPr/>
+        <p:txBody>
+          <a:bodyPr/>
+          <a:lstStyle/>
+          <a:p>
+            <a:endParaRPr lang="en-US"/>
+          </a:p>
+        </p:txBody>
+      </p:sp>
+      <p:pic>
+        <p:nvPicPr>
+          <p:cNvPr id="4" name="Picture 3" descr="http://www.bitcoincharts.com/charts/chart.png?width=940&amp;m=bitstampUSD&amp;SubmitButton=Draw&amp;r=360&amp;i=&amp;c=0&amp;s=&amp;e=&amp;Prev=&amp;Next=&amp;t=T&amp;b=&amp;a1=&amp;m1=10&amp;a2=&amp;m2=25&amp;x=0&amp;i1=&amp;i2=&amp;i3=&amp;i4=&amp;v=0&amp;cv=0&amp;ps=0&amp;l=0&amp;p=0&amp;"/>
+          <p:cNvPicPr/>
+          <p:nvPr/>
+        </p:nvPicPr>
+        <p:blipFill>
+          <a:blip r:embed="rId2">
+            <a:extLst>
+              <a:ext uri="{28A0092B-C50C-407E-A947-70E740481C1C}">
+                <a14:useLocalDpi xmlns:a14="http://schemas.microsoft.com/office/drawing/2010/main" val="0"/>
+              </a:ext>
+            </a:extLst>
+          </a:blip>
+          <a:srcRect/>
+          <a:stretch>
+            <a:fillRect/>
+          </a:stretch>
+        </p:blipFill>
+        <p:spPr bwMode="auto">
+          <a:xfrm>
+            <a:off x="1447800" y="1241552"/>
+            <a:ext cx="5943600" cy="2199640"/>
+          </a:xfrm>
+          <a:prstGeom prst="rect">
+            <a:avLst/>
+          </a:prstGeom>
+          <a:noFill/>
+          <a:ln>
+            <a:noFill/>
+          </a:ln>
+        </p:spPr>
+      </p:pic>
+      <p:pic>
+        <p:nvPicPr>
+          <p:cNvPr id="5" name="Picture 4" descr="http://www.bitcoincharts.com/charts/chart.png?width=940&amp;m=coinbaseUSD&amp;SubmitButton=Draw&amp;r=360&amp;i=&amp;c=0&amp;s=&amp;e=&amp;Prev=&amp;Next=&amp;t=T&amp;b=&amp;a1=&amp;m1=10&amp;a2=&amp;m2=25&amp;x=0&amp;i1=&amp;i2=&amp;i3=&amp;i4=&amp;v=0&amp;cv=0&amp;ps=0&amp;l=0&amp;p=0&amp;"/>
+          <p:cNvPicPr/>
+          <p:nvPr/>
+        </p:nvPicPr>
+        <p:blipFill>
+          <a:blip r:embed="rId3">
+            <a:extLst>
+              <a:ext uri="{28A0092B-C50C-407E-A947-70E740481C1C}">
+                <a14:useLocalDpi xmlns:a14="http://schemas.microsoft.com/office/drawing/2010/main" val="0"/>
+              </a:ext>
+            </a:extLst>
+          </a:blip>
+          <a:srcRect/>
+          <a:stretch>
+            <a:fillRect/>
+          </a:stretch>
+        </p:blipFill>
+        <p:spPr bwMode="auto">
+          <a:xfrm>
+            <a:off x="1447800" y="3581400"/>
+            <a:ext cx="5943600" cy="2199640"/>
+          </a:xfrm>
+          <a:prstGeom prst="rect">
+            <a:avLst/>
+          </a:prstGeom>
+          <a:noFill/>
+          <a:ln>
+            <a:noFill/>
+          </a:ln>
+        </p:spPr>
+      </p:pic>
+    </p:spTree>
+    <p:extLst>
+      <p:ext uri="{BB962C8B-B14F-4D97-AF65-F5344CB8AC3E}">
+        <p14:creationId xmlns:p14="http://schemas.microsoft.com/office/powerpoint/2010/main" val="1478175100"/>
+      </p:ext>
+    </p:extLst>
+  </p:cSld>
+  <p:clrMapOvr>
+    <a:masterClrMapping/>
+  </p:clrMapOvr>
 </p:sld>
 </file>
 

</xml_diff>